<commit_message>
minor formatting in BFS slides
</commit_message>
<xml_diff>
--- a/slides/graphs-bfs-f21.pptx
+++ b/slides/graphs-bfs-f21.pptx
@@ -7093,8 +7093,8 @@
           </a:p>
         </p:txBody>
       </p:sp>
-      <mc:AlternateContent xmlns:mc="http://schemas.openxmlformats.org/markup-compatibility/2006">
-        <mc:Choice xmlns:a14="http://schemas.microsoft.com/office/drawing/2010/main" Requires="a14">
+      <mc:AlternateContent xmlns:mc="http://schemas.openxmlformats.org/markup-compatibility/2006" xmlns:a14="http://schemas.microsoft.com/office/drawing/2010/main">
+        <mc:Choice Requires="a14">
           <p:sp>
             <p:nvSpPr>
               <p:cNvPr id="40963" name="Rectangle 3"/>
@@ -7350,7 +7350,7 @@
             </p:txBody>
           </p:sp>
         </mc:Choice>
-        <mc:Fallback>
+        <mc:Fallback xmlns="">
           <p:sp>
             <p:nvSpPr>
               <p:cNvPr id="40963" name="Rectangle 3"/>
@@ -7360,13 +7360,13 @@
               <p:nvPr>
                 <p:ph sz="quarter" idx="1"/>
                 <p:custDataLst>
-                  <p:tags r:id="rId2"/>
+                  <p:tags r:id="rId4"/>
                 </p:custDataLst>
               </p:nvPr>
             </p:nvSpPr>
             <p:spPr>
               <a:blipFill>
-                <a:blip r:embed="rId4"/>
+                <a:blip r:embed="rId5"/>
                 <a:stretch>
                   <a:fillRect l="-1042" t="-2314" r="-926"/>
                 </a:stretch>
@@ -7498,8 +7498,8 @@
           </a:p>
         </p:txBody>
       </p:sp>
-      <mc:AlternateContent xmlns:mc="http://schemas.openxmlformats.org/markup-compatibility/2006">
-        <mc:Choice xmlns:a14="http://schemas.microsoft.com/office/drawing/2010/main" Requires="a14">
+      <mc:AlternateContent xmlns:mc="http://schemas.openxmlformats.org/markup-compatibility/2006" xmlns:a14="http://schemas.microsoft.com/office/drawing/2010/main">
+        <mc:Choice Requires="a14">
           <p:sp>
             <p:nvSpPr>
               <p:cNvPr id="40963" name="Rectangle 3"/>
@@ -7748,7 +7748,7 @@
             </p:txBody>
           </p:sp>
         </mc:Choice>
-        <mc:Fallback>
+        <mc:Fallback xmlns="">
           <p:sp>
             <p:nvSpPr>
               <p:cNvPr id="40963" name="Rectangle 3"/>
@@ -7758,13 +7758,13 @@
               <p:nvPr>
                 <p:ph sz="quarter" idx="1"/>
                 <p:custDataLst>
-                  <p:tags r:id="rId2"/>
+                  <p:tags r:id="rId4"/>
                 </p:custDataLst>
               </p:nvPr>
             </p:nvSpPr>
             <p:spPr>
               <a:blipFill>
-                <a:blip r:embed="rId4"/>
+                <a:blip r:embed="rId5"/>
                 <a:stretch>
                   <a:fillRect l="-1042" t="-2057" r="-926"/>
                 </a:stretch>
@@ -7832,7 +7832,7 @@
           <p:nvPr/>
         </p:nvPicPr>
         <p:blipFill>
-          <a:blip r:embed="rId5"/>
+          <a:blip r:embed="rId6"/>
           <a:stretch>
             <a:fillRect/>
           </a:stretch>
@@ -7976,19 +7976,60 @@
                 </a:pPr>
                 <a:r>
                   <a:rPr lang="en-US" dirty="0"/>
-                  <a:t>Suppose during BFS execution, the Queue contains vertices {v1,v2,….</a:t>
+                  <a:t>Suppose during BFS execution, the Queue contains vertices {v</a:t>
+                </a:r>
+                <a:r>
+                  <a:rPr lang="en-US" baseline="-25000" dirty="0">
+                    <a:latin typeface="Calibri" panose="020F0502020204030204" pitchFamily="34" charset="0"/>
+                    <a:cs typeface="Calibri" panose="020F0502020204030204" pitchFamily="34" charset="0"/>
+                  </a:rPr>
+                  <a:t>1</a:t>
+                </a:r>
+                <a:r>
+                  <a:rPr lang="en-US" dirty="0"/>
+                  <a:t>,v</a:t>
+                </a:r>
+                <a:r>
+                  <a:rPr lang="en-US" baseline="-25000" dirty="0">
+                    <a:latin typeface="Calibri" panose="020F0502020204030204" pitchFamily="34" charset="0"/>
+                    <a:cs typeface="Calibri" panose="020F0502020204030204" pitchFamily="34" charset="0"/>
+                  </a:rPr>
+                  <a:t>2</a:t>
+                </a:r>
+                <a:r>
+                  <a:rPr lang="en-US" dirty="0"/>
+                  <a:t>,….</a:t>
                 </a:r>
                 <a:r>
                   <a:rPr lang="en-US" dirty="0" err="1"/>
-                  <a:t>vn</a:t>
+                  <a:t>v</a:t>
+                </a:r>
+                <a:r>
+                  <a:rPr lang="en-US" baseline="-25000" dirty="0" err="1"/>
+                  <a:t>n</a:t>
                 </a:r>
                 <a:r>
                   <a:rPr lang="en-US" dirty="0"/>
-                  <a:t>} where v1 is at head of queue and </a:t>
+                  <a:t>} where v</a:t>
+                </a:r>
+                <a:r>
+                  <a:rPr lang="en-US" baseline="-25000" dirty="0">
+                    <a:latin typeface="Calibri" panose="020F0502020204030204" pitchFamily="34" charset="0"/>
+                    <a:cs typeface="Calibri" panose="020F0502020204030204" pitchFamily="34" charset="0"/>
+                  </a:rPr>
+                  <a:t>1</a:t>
+                </a:r>
+                <a:r>
+                  <a:rPr lang="en-US" dirty="0"/>
+                  <a:t> is at head of queue and </a:t>
                 </a:r>
                 <a:r>
                   <a:rPr lang="en-US" dirty="0" err="1"/>
-                  <a:t>vn</a:t>
+                  <a:t>v</a:t>
+                </a:r>
+                <a:r>
+                  <a:rPr lang="en-US" baseline="-25000" dirty="0" err="1"/>
+                  <a:t>n</a:t>
                 </a:r>
                 <a:r>
                   <a:rPr lang="en-US" dirty="0"/>
@@ -8111,7 +8152,14 @@
                 </a:r>
                 <a:r>
                   <a:rPr lang="en-US" b="0" i="1" dirty="0"/>
-                  <a:t>//all nodes on Q differ by at most 1</a:t>
+                  <a:t>//all nodes on Q differ by at most </a:t>
+                </a:r>
+                <a:r>
+                  <a:rPr lang="en-US" b="0" i="1" dirty="0">
+                    <a:latin typeface="Calibri" panose="020F0502020204030204" pitchFamily="34" charset="0"/>
+                    <a:cs typeface="Calibri" panose="020F0502020204030204" pitchFamily="34" charset="0"/>
+                  </a:rPr>
+                  <a:t>1</a:t>
                 </a:r>
               </a:p>
               <a:p>
@@ -8295,7 +8343,7 @@
               <a:blipFill>
                 <a:blip r:embed="rId4"/>
                 <a:stretch>
-                  <a:fillRect l="-1042" t="-2057" r="-926"/>
+                  <a:fillRect l="-1040" t="-2057" r="-925"/>
                 </a:stretch>
               </a:blipFill>
             </p:spPr>
@@ -10890,8 +10938,8 @@
           </a:p>
         </p:txBody>
       </p:sp>
-      <mc:AlternateContent xmlns:mc="http://schemas.openxmlformats.org/markup-compatibility/2006">
-        <mc:Choice xmlns:a14="http://schemas.microsoft.com/office/drawing/2010/main" Requires="a14">
+      <mc:AlternateContent xmlns:mc="http://schemas.openxmlformats.org/markup-compatibility/2006" xmlns:a14="http://schemas.microsoft.com/office/drawing/2010/main">
+        <mc:Choice Requires="a14">
           <p:sp>
             <p:nvSpPr>
               <p:cNvPr id="40963" name="Rectangle 3"/>
@@ -11379,7 +11427,7 @@
             </p:txBody>
           </p:sp>
         </mc:Choice>
-        <mc:Fallback>
+        <mc:Fallback xmlns="">
           <p:sp>
             <p:nvSpPr>
               <p:cNvPr id="40963" name="Rectangle 3"/>
@@ -11389,7 +11437,7 @@
               <p:nvPr>
                 <p:ph sz="quarter" idx="1"/>
                 <p:custDataLst>
-                  <p:tags r:id="rId2"/>
+                  <p:tags r:id="rId4"/>
                 </p:custDataLst>
               </p:nvPr>
             </p:nvSpPr>
@@ -11399,7 +11447,7 @@
                 <a:ext cx="11277600" cy="4937760"/>
               </a:xfrm>
               <a:blipFill>
-                <a:blip r:embed="rId4"/>
+                <a:blip r:embed="rId5"/>
                 <a:stretch>
                   <a:fillRect l="-900"/>
                 </a:stretch>
@@ -11531,8 +11579,8 @@
           </a:p>
         </p:txBody>
       </p:sp>
-      <mc:AlternateContent xmlns:mc="http://schemas.openxmlformats.org/markup-compatibility/2006">
-        <mc:Choice xmlns:a14="http://schemas.microsoft.com/office/drawing/2010/main" Requires="a14">
+      <mc:AlternateContent xmlns:mc="http://schemas.openxmlformats.org/markup-compatibility/2006" xmlns:a14="http://schemas.microsoft.com/office/drawing/2010/main">
+        <mc:Choice Requires="a14">
           <p:sp>
             <p:nvSpPr>
               <p:cNvPr id="40963" name="Rectangle 3"/>
@@ -11931,7 +11979,7 @@
             </p:txBody>
           </p:sp>
         </mc:Choice>
-        <mc:Fallback>
+        <mc:Fallback xmlns="">
           <p:sp>
             <p:nvSpPr>
               <p:cNvPr id="40963" name="Rectangle 3"/>
@@ -11941,7 +11989,7 @@
               <p:nvPr>
                 <p:ph sz="quarter" idx="1"/>
                 <p:custDataLst>
-                  <p:tags r:id="rId2"/>
+                  <p:tags r:id="rId4"/>
                 </p:custDataLst>
               </p:nvPr>
             </p:nvSpPr>
@@ -11951,7 +11999,7 @@
                 <a:ext cx="11277600" cy="4937760"/>
               </a:xfrm>
               <a:blipFill>
-                <a:blip r:embed="rId4"/>
+                <a:blip r:embed="rId5"/>
                 <a:stretch>
                   <a:fillRect l="-900"/>
                 </a:stretch>
@@ -12083,8 +12131,8 @@
           </a:p>
         </p:txBody>
       </p:sp>
-      <mc:AlternateContent xmlns:mc="http://schemas.openxmlformats.org/markup-compatibility/2006">
-        <mc:Choice xmlns:a14="http://schemas.microsoft.com/office/drawing/2010/main" Requires="a14">
+      <mc:AlternateContent xmlns:mc="http://schemas.openxmlformats.org/markup-compatibility/2006" xmlns:a14="http://schemas.microsoft.com/office/drawing/2010/main">
+        <mc:Choice Requires="a14">
           <p:sp>
             <p:nvSpPr>
               <p:cNvPr id="40963" name="Rectangle 3"/>
@@ -12428,7 +12476,7 @@
             </p:txBody>
           </p:sp>
         </mc:Choice>
-        <mc:Fallback>
+        <mc:Fallback xmlns="">
           <p:sp>
             <p:nvSpPr>
               <p:cNvPr id="40963" name="Rectangle 3"/>
@@ -12438,7 +12486,7 @@
               <p:nvPr>
                 <p:ph sz="quarter" idx="1"/>
                 <p:custDataLst>
-                  <p:tags r:id="rId2"/>
+                  <p:tags r:id="rId4"/>
                 </p:custDataLst>
               </p:nvPr>
             </p:nvSpPr>
@@ -12448,7 +12496,7 @@
                 <a:ext cx="11277600" cy="4937760"/>
               </a:xfrm>
               <a:blipFill>
-                <a:blip r:embed="rId4"/>
+                <a:blip r:embed="rId5"/>
                 <a:stretch>
                   <a:fillRect l="-900" t="-1795"/>
                 </a:stretch>

</xml_diff>